<commit_message>
full res logo in pres
</commit_message>
<xml_diff>
--- a/doc/presentation/Codeshop.pptx
+++ b/doc/presentation/Codeshop.pptx
@@ -151,100 +151,6 @@
       </p:grpSpPr>
       <p:sp>
         <p:nvSpPr>
-          <p:cNvPr id="12" name="Rechteck 11"/>
-          <p:cNvSpPr/>
-          <p:nvPr/>
-        </p:nvSpPr>
-        <p:spPr>
-          <a:xfrm>
-            <a:off x="0" y="0"/>
-            <a:ext cx="9144000" cy="6858000"/>
-          </a:xfrm>
-          <a:prstGeom prst="rect">
-            <a:avLst/>
-          </a:prstGeom>
-          <a:solidFill>
-            <a:srgbClr val="FFFFFF"/>
-          </a:solidFill>
-          <a:ln w="12700" cap="flat" cmpd="sng" algn="ctr">
-            <a:noFill/>
-            <a:prstDash val="solid"/>
-          </a:ln>
-        </p:spPr>
-        <p:style>
-          <a:lnRef idx="2">
-            <a:schemeClr val="accent1"/>
-          </a:lnRef>
-          <a:fillRef idx="1">
-            <a:schemeClr val="accent1"/>
-          </a:fillRef>
-          <a:effectRef idx="0">
-            <a:schemeClr val="accent1"/>
-          </a:effectRef>
-          <a:fontRef idx="minor">
-            <a:schemeClr val="lt1"/>
-          </a:fontRef>
-        </p:style>
-        <p:txBody>
-          <a:bodyPr rtlCol="0" anchor="ctr"/>
-          <a:lstStyle/>
-          <a:p>
-            <a:pPr algn="ctr" eaLnBrk="1" latinLnBrk="0" hangingPunct="1"/>
-            <a:endParaRPr kumimoji="0" lang="en-US"/>
-          </a:p>
-        </p:txBody>
-      </p:sp>
-      <p:sp useBgFill="1">
-        <p:nvSpPr>
-          <p:cNvPr id="13" name="Abgerundetes Rechteck 12"/>
-          <p:cNvSpPr/>
-          <p:nvPr/>
-        </p:nvSpPr>
-        <p:spPr>
-          <a:xfrm>
-            <a:off x="65313" y="69755"/>
-            <a:ext cx="9013372" cy="6692201"/>
-          </a:xfrm>
-          <a:prstGeom prst="roundRect">
-            <a:avLst>
-              <a:gd name="adj" fmla="val 4929"/>
-            </a:avLst>
-          </a:prstGeom>
-          <a:ln w="6350" cap="sq" cmpd="sng" algn="ctr">
-            <a:solidFill>
-              <a:schemeClr val="tx1">
-                <a:alpha val="100000"/>
-              </a:schemeClr>
-            </a:solidFill>
-            <a:prstDash val="solid"/>
-          </a:ln>
-          <a:effectLst/>
-        </p:spPr>
-        <p:style>
-          <a:lnRef idx="3">
-            <a:schemeClr val="lt1"/>
-          </a:lnRef>
-          <a:fillRef idx="1001">
-            <a:schemeClr val="lt1"/>
-          </a:fillRef>
-          <a:effectRef idx="1">
-            <a:schemeClr val="accent1"/>
-          </a:effectRef>
-          <a:fontRef idx="minor">
-            <a:schemeClr val="lt1"/>
-          </a:fontRef>
-        </p:style>
-        <p:txBody>
-          <a:bodyPr anchor="ctr"/>
-          <a:lstStyle/>
-          <a:p>
-            <a:pPr algn="ctr" eaLnBrk="1" latinLnBrk="0" hangingPunct="1"/>
-            <a:endParaRPr kumimoji="0" lang="en-US"/>
-          </a:p>
-        </p:txBody>
-      </p:sp>
-      <p:sp>
-        <p:nvSpPr>
           <p:cNvPr id="9" name="Untertitel 8"/>
           <p:cNvSpPr>
             <a:spLocks noGrp="1"/>
@@ -321,7 +227,7 @@
           <a:p>
             <a:fld id="{635F720A-F23C-4F0A-899C-2EF970456088}" type="datetimeFigureOut">
               <a:rPr lang="de-CH" smtClean="0"/>
-              <a:t>07.01.2015</a:t>
+              <a:t>08.01.2015</a:t>
             </a:fld>
             <a:endParaRPr lang="de-CH"/>
           </a:p>
@@ -681,7 +587,7 @@
           <a:p>
             <a:fld id="{635F720A-F23C-4F0A-899C-2EF970456088}" type="datetimeFigureOut">
               <a:rPr lang="de-CH" smtClean="0"/>
-              <a:t>07.01.2015</a:t>
+              <a:t>08.01.2015</a:t>
             </a:fld>
             <a:endParaRPr lang="de-CH"/>
           </a:p>
@@ -863,7 +769,7 @@
           <a:p>
             <a:fld id="{635F720A-F23C-4F0A-899C-2EF970456088}" type="datetimeFigureOut">
               <a:rPr lang="de-CH" smtClean="0"/>
-              <a:t>07.01.2015</a:t>
+              <a:t>08.01.2015</a:t>
             </a:fld>
             <a:endParaRPr lang="de-CH"/>
           </a:p>
@@ -983,7 +889,7 @@
           <a:p>
             <a:fld id="{635F720A-F23C-4F0A-899C-2EF970456088}" type="datetimeFigureOut">
               <a:rPr lang="de-CH" smtClean="0"/>
-              <a:t>07.01.2015</a:t>
+              <a:t>08.01.2015</a:t>
             </a:fld>
             <a:endParaRPr lang="de-CH"/>
           </a:p>
@@ -1343,7 +1249,7 @@
           <a:p>
             <a:fld id="{635F720A-F23C-4F0A-899C-2EF970456088}" type="datetimeFigureOut">
               <a:rPr lang="de-CH" smtClean="0"/>
-              <a:t>07.01.2015</a:t>
+              <a:t>08.01.2015</a:t>
             </a:fld>
             <a:endParaRPr lang="de-CH"/>
           </a:p>
@@ -1615,7 +1521,7 @@
           <a:p>
             <a:fld id="{635F720A-F23C-4F0A-899C-2EF970456088}" type="datetimeFigureOut">
               <a:rPr lang="de-CH" smtClean="0"/>
-              <a:t>07.01.2015</a:t>
+              <a:t>08.01.2015</a:t>
             </a:fld>
             <a:endParaRPr lang="de-CH"/>
           </a:p>
@@ -1984,7 +1890,7 @@
           <a:p>
             <a:fld id="{635F720A-F23C-4F0A-899C-2EF970456088}" type="datetimeFigureOut">
               <a:rPr lang="de-CH" smtClean="0"/>
-              <a:t>07.01.2015</a:t>
+              <a:t>08.01.2015</a:t>
             </a:fld>
             <a:endParaRPr lang="de-CH"/>
           </a:p>
@@ -2218,7 +2124,7 @@
           <a:p>
             <a:fld id="{635F720A-F23C-4F0A-899C-2EF970456088}" type="datetimeFigureOut">
               <a:rPr lang="de-CH" smtClean="0"/>
-              <a:t>07.01.2015</a:t>
+              <a:t>08.01.2015</a:t>
             </a:fld>
             <a:endParaRPr lang="de-CH"/>
           </a:p>
@@ -2308,7 +2214,7 @@
           <a:p>
             <a:fld id="{635F720A-F23C-4F0A-899C-2EF970456088}" type="datetimeFigureOut">
               <a:rPr lang="de-CH" smtClean="0"/>
-              <a:t>07.01.2015</a:t>
+              <a:t>08.01.2015</a:t>
             </a:fld>
             <a:endParaRPr lang="de-CH"/>
           </a:p>
@@ -2582,7 +2488,7 @@
           <a:p>
             <a:fld id="{635F720A-F23C-4F0A-899C-2EF970456088}" type="datetimeFigureOut">
               <a:rPr lang="de-CH" smtClean="0"/>
-              <a:t>07.01.2015</a:t>
+              <a:t>08.01.2015</a:t>
             </a:fld>
             <a:endParaRPr lang="de-CH"/>
           </a:p>
@@ -2817,7 +2723,7 @@
           <a:p>
             <a:fld id="{635F720A-F23C-4F0A-899C-2EF970456088}" type="datetimeFigureOut">
               <a:rPr lang="de-CH" smtClean="0"/>
-              <a:t>07.01.2015</a:t>
+              <a:t>08.01.2015</a:t>
             </a:fld>
             <a:endParaRPr lang="de-CH"/>
           </a:p>
@@ -3142,55 +3048,6 @@
           </a:p>
         </p:txBody>
       </p:sp>
-      <p:sp useBgFill="1">
-        <p:nvSpPr>
-          <p:cNvPr id="8" name="Abgerundetes Rechteck 7"/>
-          <p:cNvSpPr/>
-          <p:nvPr/>
-        </p:nvSpPr>
-        <p:spPr>
-          <a:xfrm>
-            <a:off x="64008" y="69755"/>
-            <a:ext cx="9013372" cy="6693408"/>
-          </a:xfrm>
-          <a:prstGeom prst="roundRect">
-            <a:avLst>
-              <a:gd name="adj" fmla="val 4929"/>
-            </a:avLst>
-          </a:prstGeom>
-          <a:ln w="6350" cap="sq" cmpd="sng" algn="ctr">
-            <a:solidFill>
-              <a:schemeClr val="tx1">
-                <a:alpha val="100000"/>
-              </a:schemeClr>
-            </a:solidFill>
-            <a:prstDash val="solid"/>
-          </a:ln>
-          <a:effectLst/>
-        </p:spPr>
-        <p:style>
-          <a:lnRef idx="3">
-            <a:schemeClr val="lt1"/>
-          </a:lnRef>
-          <a:fillRef idx="1001">
-            <a:schemeClr val="lt1"/>
-          </a:fillRef>
-          <a:effectRef idx="1">
-            <a:schemeClr val="accent1"/>
-          </a:effectRef>
-          <a:fontRef idx="minor">
-            <a:schemeClr val="lt1"/>
-          </a:fontRef>
-        </p:style>
-        <p:txBody>
-          <a:bodyPr anchor="ctr"/>
-          <a:lstStyle/>
-          <a:p>
-            <a:pPr algn="ctr" eaLnBrk="1" latinLnBrk="0" hangingPunct="1"/>
-            <a:endParaRPr kumimoji="0" lang="en-US"/>
-          </a:p>
-        </p:txBody>
-      </p:sp>
       <p:sp>
         <p:nvSpPr>
           <p:cNvPr id="22" name="Titelplatzhalter 21"/>
@@ -3319,7 +3176,7 @@
           <a:p>
             <a:fld id="{635F720A-F23C-4F0A-899C-2EF970456088}" type="datetimeFigureOut">
               <a:rPr lang="de-CH" smtClean="0"/>
-              <a:t>07.01.2015</a:t>
+              <a:t>08.01.2015</a:t>
             </a:fld>
             <a:endParaRPr lang="de-CH"/>
           </a:p>
@@ -3732,43 +3589,32 @@
       </p:grpSpPr>
       <p:pic>
         <p:nvPicPr>
-          <p:cNvPr id="4098" name="Picture 2" descr="E:\codeshop\logo.png"/>
+          <p:cNvPr id="2" name="Grafik 1"/>
           <p:cNvPicPr>
-            <a:picLocks noChangeAspect="1" noChangeArrowheads="1"/>
+            <a:picLocks noChangeAspect="1"/>
           </p:cNvPicPr>
           <p:nvPr/>
         </p:nvPicPr>
         <p:blipFill>
-          <a:blip r:embed="rId2">
+          <a:blip r:embed="rId2" cstate="print">
             <a:extLst>
               <a:ext uri="{28A0092B-C50C-407E-A947-70E740481C1C}">
                 <a14:useLocalDpi xmlns:a14="http://schemas.microsoft.com/office/drawing/2010/main" val="0"/>
               </a:ext>
             </a:extLst>
           </a:blip>
-          <a:srcRect/>
           <a:stretch>
             <a:fillRect/>
           </a:stretch>
         </p:blipFill>
-        <p:spPr bwMode="auto">
-          <a:xfrm>
-            <a:off x="3750802" y="2420888"/>
-            <a:ext cx="1625987" cy="1512168"/>
+        <p:spPr>
+          <a:xfrm>
+            <a:off x="3563889" y="2494481"/>
+            <a:ext cx="2016222" cy="1869038"/>
           </a:xfrm>
           <a:prstGeom prst="rect">
             <a:avLst/>
           </a:prstGeom>
-          <a:noFill/>
-          <a:extLst>
-            <a:ext uri="{909E8E84-426E-40DD-AFC4-6F175D3DCCD1}">
-              <a14:hiddenFill xmlns:a14="http://schemas.microsoft.com/office/drawing/2010/main">
-                <a:solidFill>
-                  <a:srgbClr val="FFFFFF"/>
-                </a:solidFill>
-              </a14:hiddenFill>
-            </a:ext>
-          </a:extLst>
         </p:spPr>
       </p:pic>
     </p:spTree>

</xml_diff>